<commit_message>
one more hint for lab # 6
</commit_message>
<xml_diff>
--- a/classes/prog2017/Lab06.pptx
+++ b/classes/prog2017/Lab06.pptx
@@ -3807,7 +3807,7 @@
         </p:nvSpPr>
         <p:spPr>
           <a:xfrm>
-            <a:off x="228600" y="6238656"/>
+            <a:off x="228600" y="6172200"/>
             <a:ext cx="9296400" cy="646331"/>
           </a:xfrm>
           <a:prstGeom prst="rect">
@@ -3865,8 +3865,8 @@
         </p:nvSpPr>
         <p:spPr>
           <a:xfrm>
-            <a:off x="457200" y="152400"/>
-            <a:ext cx="8456289" cy="5632311"/>
+            <a:off x="457200" y="76200"/>
+            <a:ext cx="7548605" cy="6309420"/>
           </a:xfrm>
           <a:prstGeom prst="rect">
             <a:avLst/>
@@ -3880,7 +3880,7 @@
           <a:lstStyle/>
           <a:p>
             <a:r>
-              <a:rPr lang="en-US" dirty="0">
+              <a:rPr lang="en-US" sz="1600" dirty="0">
                 <a:latin typeface="Arial" panose="020B0604020202020204" pitchFamily="34" charset="0"/>
                 <a:cs typeface="Arial" panose="020B0604020202020204" pitchFamily="34" charset="0"/>
               </a:rPr>
@@ -3888,14 +3888,14 @@
             </a:r>
           </a:p>
           <a:p>
-            <a:endParaRPr lang="en-US" dirty="0">
+            <a:endParaRPr lang="en-US" sz="1600" dirty="0">
               <a:latin typeface="Arial" panose="020B0604020202020204" pitchFamily="34" charset="0"/>
               <a:cs typeface="Arial" panose="020B0604020202020204" pitchFamily="34" charset="0"/>
             </a:endParaRPr>
           </a:p>
           <a:p>
             <a:r>
-              <a:rPr lang="en-US" dirty="0">
+              <a:rPr lang="en-US" sz="1600" dirty="0">
                 <a:latin typeface="Arial" panose="020B0604020202020204" pitchFamily="34" charset="0"/>
                 <a:cs typeface="Arial" panose="020B0604020202020204" pitchFamily="34" charset="0"/>
               </a:rPr>
@@ -3903,163 +3903,325 @@
             </a:r>
           </a:p>
           <a:p>
-            <a:endParaRPr lang="en-US" dirty="0"/>
-          </a:p>
-          <a:p>
-            <a:r>
-              <a:rPr lang="en-US" dirty="0"/>
-              <a:t>Map&lt;String, Map&lt;</a:t>
-            </a:r>
-            <a:r>
-              <a:rPr lang="en-US" dirty="0" err="1"/>
-              <a:t>String,Integer</a:t>
-            </a:r>
-            <a:r>
-              <a:rPr lang="en-US" dirty="0"/>
-              <a:t>&gt;&gt; </a:t>
-            </a:r>
-          </a:p>
-          <a:p>
-            <a:endParaRPr lang="en-US" dirty="0">
+            <a:endParaRPr lang="en-US" sz="1600" dirty="0">
               <a:latin typeface="Arial" panose="020B0604020202020204" pitchFamily="34" charset="0"/>
               <a:cs typeface="Arial" panose="020B0604020202020204" pitchFamily="34" charset="0"/>
             </a:endParaRPr>
           </a:p>
           <a:p>
             <a:r>
-              <a:rPr lang="en-US" dirty="0">
-                <a:latin typeface="Arial" panose="020B0604020202020204" pitchFamily="34" charset="0"/>
-                <a:cs typeface="Arial" panose="020B0604020202020204" pitchFamily="34" charset="0"/>
-              </a:rPr>
-              <a:t>Where the outer key is the DNA sequence and the inner key is the sample Id</a:t>
-            </a:r>
-          </a:p>
-          <a:p>
-            <a:r>
-              <a:rPr lang="en-US" dirty="0">
-                <a:latin typeface="Arial" panose="020B0604020202020204" pitchFamily="34" charset="0"/>
-                <a:cs typeface="Arial" panose="020B0604020202020204" pitchFamily="34" charset="0"/>
-              </a:rPr>
-              <a:t>(and the inner value is the number of times that sequence has been seen in that</a:t>
-            </a:r>
-          </a:p>
-          <a:p>
-            <a:r>
-              <a:rPr lang="en-US" dirty="0">
-                <a:latin typeface="Arial" panose="020B0604020202020204" pitchFamily="34" charset="0"/>
-                <a:cs typeface="Arial" panose="020B0604020202020204" pitchFamily="34" charset="0"/>
-              </a:rPr>
-              <a:t>Sample).</a:t>
-            </a:r>
-          </a:p>
-          <a:p>
-            <a:endParaRPr lang="en-US" dirty="0">
+              <a:rPr lang="en-US" sz="1600" dirty="0">
+                <a:latin typeface="Arial" panose="020B0604020202020204" pitchFamily="34" charset="0"/>
+                <a:cs typeface="Arial" panose="020B0604020202020204" pitchFamily="34" charset="0"/>
+              </a:rPr>
+              <a:t>Map&lt;String, Map&lt;</a:t>
+            </a:r>
+            <a:r>
+              <a:rPr lang="en-US" sz="1600" dirty="0" err="1">
+                <a:latin typeface="Arial" panose="020B0604020202020204" pitchFamily="34" charset="0"/>
+                <a:cs typeface="Arial" panose="020B0604020202020204" pitchFamily="34" charset="0"/>
+              </a:rPr>
+              <a:t>String,Integer</a:t>
+            </a:r>
+            <a:r>
+              <a:rPr lang="en-US" sz="1600" dirty="0">
+                <a:latin typeface="Arial" panose="020B0604020202020204" pitchFamily="34" charset="0"/>
+                <a:cs typeface="Arial" panose="020B0604020202020204" pitchFamily="34" charset="0"/>
+              </a:rPr>
+              <a:t>&gt;&gt; </a:t>
+            </a:r>
+          </a:p>
+          <a:p>
+            <a:endParaRPr lang="en-US" sz="1600" dirty="0">
               <a:latin typeface="Arial" panose="020B0604020202020204" pitchFamily="34" charset="0"/>
               <a:cs typeface="Arial" panose="020B0604020202020204" pitchFamily="34" charset="0"/>
             </a:endParaRPr>
           </a:p>
           <a:p>
             <a:r>
-              <a:rPr lang="en-US" dirty="0">
-                <a:latin typeface="Arial" panose="020B0604020202020204" pitchFamily="34" charset="0"/>
-                <a:cs typeface="Arial" panose="020B0604020202020204" pitchFamily="34" charset="0"/>
-              </a:rPr>
-              <a:t>(2) Don’t forget to re-use your static factory method from lab #4 that produces a </a:t>
-            </a:r>
-          </a:p>
-          <a:p>
-            <a:r>
-              <a:rPr lang="en-US" dirty="0">
-                <a:latin typeface="Arial" panose="020B0604020202020204" pitchFamily="34" charset="0"/>
-                <a:cs typeface="Arial" panose="020B0604020202020204" pitchFamily="34" charset="0"/>
-              </a:rPr>
-              <a:t>List&lt;</a:t>
-            </a:r>
-            <a:r>
-              <a:rPr lang="en-US" dirty="0" err="1">
-                <a:latin typeface="Arial" panose="020B0604020202020204" pitchFamily="34" charset="0"/>
-                <a:cs typeface="Arial" panose="020B0604020202020204" pitchFamily="34" charset="0"/>
-              </a:rPr>
-              <a:t>FastaSequence</a:t>
-            </a:r>
-            <a:r>
-              <a:rPr lang="en-US" dirty="0">
-                <a:latin typeface="Arial" panose="020B0604020202020204" pitchFamily="34" charset="0"/>
-                <a:cs typeface="Arial" panose="020B0604020202020204" pitchFamily="34" charset="0"/>
-              </a:rPr>
-              <a:t>&gt; as a starting point</a:t>
-            </a:r>
-          </a:p>
-          <a:p>
-            <a:endParaRPr lang="en-US" dirty="0">
+              <a:rPr lang="en-US" sz="1600" dirty="0">
+                <a:latin typeface="Arial" panose="020B0604020202020204" pitchFamily="34" charset="0"/>
+                <a:cs typeface="Arial" panose="020B0604020202020204" pitchFamily="34" charset="0"/>
+              </a:rPr>
+              <a:t>Where the outer key is the DNA sequence and the inner key is the sample Id</a:t>
+            </a:r>
+          </a:p>
+          <a:p>
+            <a:r>
+              <a:rPr lang="en-US" sz="1600" dirty="0">
+                <a:latin typeface="Arial" panose="020B0604020202020204" pitchFamily="34" charset="0"/>
+                <a:cs typeface="Arial" panose="020B0604020202020204" pitchFamily="34" charset="0"/>
+              </a:rPr>
+              <a:t>(and the inner value is the number of times that sequence has been seen in that</a:t>
+            </a:r>
+          </a:p>
+          <a:p>
+            <a:r>
+              <a:rPr lang="en-US" sz="1600" dirty="0">
+                <a:latin typeface="Arial" panose="020B0604020202020204" pitchFamily="34" charset="0"/>
+                <a:cs typeface="Arial" panose="020B0604020202020204" pitchFamily="34" charset="0"/>
+              </a:rPr>
+              <a:t>Sample).</a:t>
+            </a:r>
+          </a:p>
+          <a:p>
+            <a:endParaRPr lang="en-US" sz="1600" dirty="0">
               <a:latin typeface="Arial" panose="020B0604020202020204" pitchFamily="34" charset="0"/>
               <a:cs typeface="Arial" panose="020B0604020202020204" pitchFamily="34" charset="0"/>
             </a:endParaRPr>
           </a:p>
           <a:p>
             <a:r>
-              <a:rPr lang="en-US" dirty="0">
-                <a:latin typeface="Arial" panose="020B0604020202020204" pitchFamily="34" charset="0"/>
-                <a:cs typeface="Arial" panose="020B0604020202020204" pitchFamily="34" charset="0"/>
-              </a:rPr>
-              <a:t>(3) Don’t forget to call </a:t>
-            </a:r>
-            <a:r>
-              <a:rPr lang="en-US" dirty="0" err="1">
-                <a:latin typeface="Arial" panose="020B0604020202020204" pitchFamily="34" charset="0"/>
-                <a:cs typeface="Arial" panose="020B0604020202020204" pitchFamily="34" charset="0"/>
-              </a:rPr>
-              <a:t>writer.flush</a:t>
-            </a:r>
-            <a:r>
-              <a:rPr lang="en-US" dirty="0">
-                <a:latin typeface="Arial" panose="020B0604020202020204" pitchFamily="34" charset="0"/>
-                <a:cs typeface="Arial" panose="020B0604020202020204" pitchFamily="34" charset="0"/>
-              </a:rPr>
-              <a:t>() and </a:t>
-            </a:r>
-            <a:r>
-              <a:rPr lang="en-US" dirty="0" err="1">
-                <a:latin typeface="Arial" panose="020B0604020202020204" pitchFamily="34" charset="0"/>
-                <a:cs typeface="Arial" panose="020B0604020202020204" pitchFamily="34" charset="0"/>
-              </a:rPr>
-              <a:t>writer.close</a:t>
-            </a:r>
-            <a:r>
-              <a:rPr lang="en-US" dirty="0">
-                <a:latin typeface="Arial" panose="020B0604020202020204" pitchFamily="34" charset="0"/>
-                <a:cs typeface="Arial" panose="020B0604020202020204" pitchFamily="34" charset="0"/>
-              </a:rPr>
-              <a:t>() on your output stream when</a:t>
-            </a:r>
-          </a:p>
-          <a:p>
-            <a:r>
-              <a:rPr lang="en-US" dirty="0">
-                <a:latin typeface="Arial" panose="020B0604020202020204" pitchFamily="34" charset="0"/>
-                <a:cs typeface="Arial" panose="020B0604020202020204" pitchFamily="34" charset="0"/>
-              </a:rPr>
-              <a:t>you are finished writing the output file.</a:t>
-            </a:r>
-          </a:p>
-          <a:p>
-            <a:endParaRPr lang="en-US" dirty="0">
+              <a:rPr lang="en-US" sz="1600" dirty="0">
+                <a:latin typeface="Arial" panose="020B0604020202020204" pitchFamily="34" charset="0"/>
+                <a:cs typeface="Arial" panose="020B0604020202020204" pitchFamily="34" charset="0"/>
+              </a:rPr>
+              <a:t>(2) Don’t forget to re-use your static factory method from lab #4 that produces a </a:t>
+            </a:r>
+          </a:p>
+          <a:p>
+            <a:r>
+              <a:rPr lang="en-US" sz="1600" dirty="0">
+                <a:latin typeface="Arial" panose="020B0604020202020204" pitchFamily="34" charset="0"/>
+                <a:cs typeface="Arial" panose="020B0604020202020204" pitchFamily="34" charset="0"/>
+              </a:rPr>
+              <a:t>List&lt;</a:t>
+            </a:r>
+            <a:r>
+              <a:rPr lang="en-US" sz="1600" dirty="0" err="1">
+                <a:latin typeface="Arial" panose="020B0604020202020204" pitchFamily="34" charset="0"/>
+                <a:cs typeface="Arial" panose="020B0604020202020204" pitchFamily="34" charset="0"/>
+              </a:rPr>
+              <a:t>FastaSequence</a:t>
+            </a:r>
+            <a:r>
+              <a:rPr lang="en-US" sz="1600" dirty="0">
+                <a:latin typeface="Arial" panose="020B0604020202020204" pitchFamily="34" charset="0"/>
+                <a:cs typeface="Arial" panose="020B0604020202020204" pitchFamily="34" charset="0"/>
+              </a:rPr>
+              <a:t>&gt; as a starting point</a:t>
+            </a:r>
+          </a:p>
+          <a:p>
+            <a:endParaRPr lang="en-US" sz="1600" dirty="0">
               <a:latin typeface="Arial" panose="020B0604020202020204" pitchFamily="34" charset="0"/>
               <a:cs typeface="Arial" panose="020B0604020202020204" pitchFamily="34" charset="0"/>
             </a:endParaRPr>
           </a:p>
           <a:p>
             <a:r>
-              <a:rPr lang="en-US" dirty="0">
-                <a:latin typeface="Arial" panose="020B0604020202020204" pitchFamily="34" charset="0"/>
-                <a:cs typeface="Arial" panose="020B0604020202020204" pitchFamily="34" charset="0"/>
-              </a:rPr>
-              <a:t>(4) You can just send me/check in your code (I don’t need the data files your</a:t>
-            </a:r>
-          </a:p>
-          <a:p>
-            <a:r>
-              <a:rPr lang="en-US" dirty="0">
+              <a:rPr lang="en-US" sz="1600" dirty="0">
+                <a:latin typeface="Arial" panose="020B0604020202020204" pitchFamily="34" charset="0"/>
+                <a:cs typeface="Arial" panose="020B0604020202020204" pitchFamily="34" charset="0"/>
+              </a:rPr>
+              <a:t>(3) Don’t forget to call </a:t>
+            </a:r>
+            <a:r>
+              <a:rPr lang="en-US" sz="1600" dirty="0" err="1">
+                <a:latin typeface="Arial" panose="020B0604020202020204" pitchFamily="34" charset="0"/>
+                <a:cs typeface="Arial" panose="020B0604020202020204" pitchFamily="34" charset="0"/>
+              </a:rPr>
+              <a:t>writer.flush</a:t>
+            </a:r>
+            <a:r>
+              <a:rPr lang="en-US" sz="1600" dirty="0">
+                <a:latin typeface="Arial" panose="020B0604020202020204" pitchFamily="34" charset="0"/>
+                <a:cs typeface="Arial" panose="020B0604020202020204" pitchFamily="34" charset="0"/>
+              </a:rPr>
+              <a:t>() and </a:t>
+            </a:r>
+            <a:r>
+              <a:rPr lang="en-US" sz="1600" dirty="0" err="1">
+                <a:latin typeface="Arial" panose="020B0604020202020204" pitchFamily="34" charset="0"/>
+                <a:cs typeface="Arial" panose="020B0604020202020204" pitchFamily="34" charset="0"/>
+              </a:rPr>
+              <a:t>writer.close</a:t>
+            </a:r>
+            <a:r>
+              <a:rPr lang="en-US" sz="1600" dirty="0">
+                <a:latin typeface="Arial" panose="020B0604020202020204" pitchFamily="34" charset="0"/>
+                <a:cs typeface="Arial" panose="020B0604020202020204" pitchFamily="34" charset="0"/>
+              </a:rPr>
+              <a:t>() on your output stream when</a:t>
+            </a:r>
+          </a:p>
+          <a:p>
+            <a:r>
+              <a:rPr lang="en-US" sz="1600" dirty="0">
+                <a:latin typeface="Arial" panose="020B0604020202020204" pitchFamily="34" charset="0"/>
+                <a:cs typeface="Arial" panose="020B0604020202020204" pitchFamily="34" charset="0"/>
+              </a:rPr>
+              <a:t>you are finished writing the output file.</a:t>
+            </a:r>
+          </a:p>
+          <a:p>
+            <a:endParaRPr lang="en-US" sz="1600" dirty="0">
+              <a:latin typeface="Arial" panose="020B0604020202020204" pitchFamily="34" charset="0"/>
+              <a:cs typeface="Arial" panose="020B0604020202020204" pitchFamily="34" charset="0"/>
+            </a:endParaRPr>
+          </a:p>
+          <a:p>
+            <a:r>
+              <a:rPr lang="en-US" sz="1600" dirty="0">
+                <a:latin typeface="Arial" panose="020B0604020202020204" pitchFamily="34" charset="0"/>
+                <a:cs typeface="Arial" panose="020B0604020202020204" pitchFamily="34" charset="0"/>
+              </a:rPr>
+              <a:t>(4) You can get the second token with code like: </a:t>
+            </a:r>
+          </a:p>
+          <a:p>
+            <a:r>
+              <a:rPr lang="en-US" sz="1600" dirty="0">
+                <a:latin typeface="Arial" panose="020B0604020202020204" pitchFamily="34" charset="0"/>
+                <a:cs typeface="Arial" panose="020B0604020202020204" pitchFamily="34" charset="0"/>
+              </a:rPr>
+              <a:t>	</a:t>
+            </a:r>
+            <a:r>
+              <a:rPr lang="en-US" sz="1600" dirty="0" err="1">
+                <a:latin typeface="Arial" panose="020B0604020202020204" pitchFamily="34" charset="0"/>
+                <a:cs typeface="Arial" panose="020B0604020202020204" pitchFamily="34" charset="0"/>
+              </a:rPr>
+              <a:t>StringTokenizer</a:t>
+            </a:r>
+            <a:r>
+              <a:rPr lang="en-US" sz="1600" dirty="0">
+                <a:latin typeface="Arial" panose="020B0604020202020204" pitchFamily="34" charset="0"/>
+                <a:cs typeface="Arial" panose="020B0604020202020204" pitchFamily="34" charset="0"/>
+              </a:rPr>
+              <a:t> </a:t>
+            </a:r>
+            <a:r>
+              <a:rPr lang="en-US" sz="1600" dirty="0" err="1">
+                <a:latin typeface="Arial" panose="020B0604020202020204" pitchFamily="34" charset="0"/>
+                <a:cs typeface="Arial" panose="020B0604020202020204" pitchFamily="34" charset="0"/>
+              </a:rPr>
+              <a:t>sToken</a:t>
+            </a:r>
+            <a:r>
+              <a:rPr lang="en-US" sz="1600" dirty="0">
+                <a:latin typeface="Arial" panose="020B0604020202020204" pitchFamily="34" charset="0"/>
+                <a:cs typeface="Arial" panose="020B0604020202020204" pitchFamily="34" charset="0"/>
+              </a:rPr>
+              <a:t> = </a:t>
+            </a:r>
+            <a:r>
+              <a:rPr lang="en-US" sz="1600" b="1" dirty="0">
+                <a:latin typeface="Arial" panose="020B0604020202020204" pitchFamily="34" charset="0"/>
+                <a:cs typeface="Arial" panose="020B0604020202020204" pitchFamily="34" charset="0"/>
+              </a:rPr>
+              <a:t>new </a:t>
+            </a:r>
+            <a:r>
+              <a:rPr lang="en-US" sz="1600" b="1" dirty="0" err="1">
+                <a:latin typeface="Arial" panose="020B0604020202020204" pitchFamily="34" charset="0"/>
+                <a:cs typeface="Arial" panose="020B0604020202020204" pitchFamily="34" charset="0"/>
+              </a:rPr>
+              <a:t>StringTokenizer</a:t>
+            </a:r>
+            <a:r>
+              <a:rPr lang="en-US" sz="1600" b="1" dirty="0">
+                <a:latin typeface="Arial" panose="020B0604020202020204" pitchFamily="34" charset="0"/>
+                <a:cs typeface="Arial" panose="020B0604020202020204" pitchFamily="34" charset="0"/>
+              </a:rPr>
+              <a:t>(</a:t>
+            </a:r>
+            <a:r>
+              <a:rPr lang="en-US" sz="1600" b="1" dirty="0" err="1">
+                <a:latin typeface="Arial" panose="020B0604020202020204" pitchFamily="34" charset="0"/>
+                <a:cs typeface="Arial" panose="020B0604020202020204" pitchFamily="34" charset="0"/>
+              </a:rPr>
+              <a:t>fs.getHeader</a:t>
+            </a:r>
+            <a:r>
+              <a:rPr lang="en-US" sz="1600" b="1" dirty="0">
+                <a:latin typeface="Arial" panose="020B0604020202020204" pitchFamily="34" charset="0"/>
+                <a:cs typeface="Arial" panose="020B0604020202020204" pitchFamily="34" charset="0"/>
+              </a:rPr>
+              <a:t>());</a:t>
+            </a:r>
+          </a:p>
+          <a:p>
+            <a:r>
+              <a:rPr lang="en-US" sz="1600" dirty="0">
+                <a:latin typeface="Arial" panose="020B0604020202020204" pitchFamily="34" charset="0"/>
+                <a:cs typeface="Arial" panose="020B0604020202020204" pitchFamily="34" charset="0"/>
+              </a:rPr>
+              <a:t>   	</a:t>
+            </a:r>
+            <a:r>
+              <a:rPr lang="en-US" sz="1600" dirty="0" err="1">
+                <a:latin typeface="Arial" panose="020B0604020202020204" pitchFamily="34" charset="0"/>
+                <a:cs typeface="Arial" panose="020B0604020202020204" pitchFamily="34" charset="0"/>
+              </a:rPr>
+              <a:t>sToken.nextToken</a:t>
+            </a:r>
+            <a:r>
+              <a:rPr lang="en-US" sz="1600" dirty="0">
+                <a:latin typeface="Arial" panose="020B0604020202020204" pitchFamily="34" charset="0"/>
+                <a:cs typeface="Arial" panose="020B0604020202020204" pitchFamily="34" charset="0"/>
+              </a:rPr>
+              <a:t>();</a:t>
+            </a:r>
+          </a:p>
+          <a:p>
+            <a:r>
+              <a:rPr lang="en-US" sz="1600" dirty="0">
+                <a:latin typeface="Arial" panose="020B0604020202020204" pitchFamily="34" charset="0"/>
+                <a:cs typeface="Arial" panose="020B0604020202020204" pitchFamily="34" charset="0"/>
+              </a:rPr>
+              <a:t>   	String key = </a:t>
+            </a:r>
+            <a:r>
+              <a:rPr lang="en-US" sz="1600" dirty="0" err="1">
+                <a:latin typeface="Arial" panose="020B0604020202020204" pitchFamily="34" charset="0"/>
+                <a:cs typeface="Arial" panose="020B0604020202020204" pitchFamily="34" charset="0"/>
+              </a:rPr>
+              <a:t>sToken.nextToken</a:t>
+            </a:r>
+            <a:r>
+              <a:rPr lang="en-US" sz="1600" dirty="0">
+                <a:latin typeface="Arial" panose="020B0604020202020204" pitchFamily="34" charset="0"/>
+                <a:cs typeface="Arial" panose="020B0604020202020204" pitchFamily="34" charset="0"/>
+              </a:rPr>
+              <a:t>()</a:t>
+            </a:r>
+          </a:p>
+          <a:p>
+            <a:r>
+              <a:rPr lang="en-US" sz="1600" dirty="0">
+                <a:latin typeface="Arial" panose="020B0604020202020204" pitchFamily="34" charset="0"/>
+                <a:cs typeface="Arial" panose="020B0604020202020204" pitchFamily="34" charset="0"/>
+              </a:rPr>
+              <a:t>(where fs is a reference to a </a:t>
+            </a:r>
+            <a:r>
+              <a:rPr lang="en-US" sz="1600" dirty="0" err="1">
+                <a:latin typeface="Arial" panose="020B0604020202020204" pitchFamily="34" charset="0"/>
+                <a:cs typeface="Arial" panose="020B0604020202020204" pitchFamily="34" charset="0"/>
+              </a:rPr>
+              <a:t>FastaSequence</a:t>
+            </a:r>
+            <a:r>
+              <a:rPr lang="en-US" sz="1600" dirty="0">
+                <a:latin typeface="Arial" panose="020B0604020202020204" pitchFamily="34" charset="0"/>
+                <a:cs typeface="Arial" panose="020B0604020202020204" pitchFamily="34" charset="0"/>
+              </a:rPr>
+              <a:t> object)</a:t>
+            </a:r>
+          </a:p>
+          <a:p>
+            <a:r>
+              <a:rPr lang="en-US" sz="1600" dirty="0">
+                <a:latin typeface="Arial" panose="020B0604020202020204" pitchFamily="34" charset="0"/>
+                <a:cs typeface="Arial" panose="020B0604020202020204" pitchFamily="34" charset="0"/>
+              </a:rPr>
+              <a:t>(5) You can just send me/check in your code (I don’t need the data files your</a:t>
+            </a:r>
+          </a:p>
+          <a:p>
+            <a:r>
+              <a:rPr lang="en-US" sz="1600" dirty="0">
                 <a:latin typeface="Arial" panose="020B0604020202020204" pitchFamily="34" charset="0"/>
                 <a:cs typeface="Arial" panose="020B0604020202020204" pitchFamily="34" charset="0"/>
               </a:rPr>

</xml_diff>